<commit_message>
commiting this push will update the poster to current state and delete the old state.
</commit_message>
<xml_diff>
--- a/RamanNoodlesPoster_wi2019.pptx
+++ b/RamanNoodlesPoster_wi2019.pptx
@@ -104,6 +104,11 @@
       </a:defRPr>
     </a:lvl9pPr>
   </p:defaultTextStyle>
+  <p:extLst>
+    <p:ext uri="{EFAFB233-063F-42B5-8137-9DF3F51BA10A}">
+      <p15:sldGuideLst xmlns:p15="http://schemas.microsoft.com/office/powerpoint/2012/main"/>
+    </p:ext>
+  </p:extLst>
 </p:presentation>
 </file>
 
@@ -238,7 +243,7 @@
           <a:p>
             <a:fld id="{3A33143C-BC35-4C3F-99A8-1253A60EB430}" type="datetimeFigureOut">
               <a:rPr lang="en-US" smtClean="0"/>
-              <a:t>3/8/2019</a:t>
+              <a:t>3/15/2019</a:t>
             </a:fld>
             <a:endParaRPr lang="en-US"/>
           </a:p>
@@ -408,7 +413,7 @@
           <a:p>
             <a:fld id="{3A33143C-BC35-4C3F-99A8-1253A60EB430}" type="datetimeFigureOut">
               <a:rPr lang="en-US" smtClean="0"/>
-              <a:t>3/8/2019</a:t>
+              <a:t>3/15/2019</a:t>
             </a:fld>
             <a:endParaRPr lang="en-US"/>
           </a:p>
@@ -588,7 +593,7 @@
           <a:p>
             <a:fld id="{3A33143C-BC35-4C3F-99A8-1253A60EB430}" type="datetimeFigureOut">
               <a:rPr lang="en-US" smtClean="0"/>
-              <a:t>3/8/2019</a:t>
+              <a:t>3/15/2019</a:t>
             </a:fld>
             <a:endParaRPr lang="en-US"/>
           </a:p>
@@ -758,7 +763,7 @@
           <a:p>
             <a:fld id="{3A33143C-BC35-4C3F-99A8-1253A60EB430}" type="datetimeFigureOut">
               <a:rPr lang="en-US" smtClean="0"/>
-              <a:t>3/8/2019</a:t>
+              <a:t>3/15/2019</a:t>
             </a:fld>
             <a:endParaRPr lang="en-US"/>
           </a:p>
@@ -1002,7 +1007,7 @@
           <a:p>
             <a:fld id="{3A33143C-BC35-4C3F-99A8-1253A60EB430}" type="datetimeFigureOut">
               <a:rPr lang="en-US" smtClean="0"/>
-              <a:t>3/8/2019</a:t>
+              <a:t>3/15/2019</a:t>
             </a:fld>
             <a:endParaRPr lang="en-US"/>
           </a:p>
@@ -1234,7 +1239,7 @@
           <a:p>
             <a:fld id="{3A33143C-BC35-4C3F-99A8-1253A60EB430}" type="datetimeFigureOut">
               <a:rPr lang="en-US" smtClean="0"/>
-              <a:t>3/8/2019</a:t>
+              <a:t>3/15/2019</a:t>
             </a:fld>
             <a:endParaRPr lang="en-US"/>
           </a:p>
@@ -1601,7 +1606,7 @@
           <a:p>
             <a:fld id="{3A33143C-BC35-4C3F-99A8-1253A60EB430}" type="datetimeFigureOut">
               <a:rPr lang="en-US" smtClean="0"/>
-              <a:t>3/8/2019</a:t>
+              <a:t>3/15/2019</a:t>
             </a:fld>
             <a:endParaRPr lang="en-US"/>
           </a:p>
@@ -1719,7 +1724,7 @@
           <a:p>
             <a:fld id="{3A33143C-BC35-4C3F-99A8-1253A60EB430}" type="datetimeFigureOut">
               <a:rPr lang="en-US" smtClean="0"/>
-              <a:t>3/8/2019</a:t>
+              <a:t>3/15/2019</a:t>
             </a:fld>
             <a:endParaRPr lang="en-US"/>
           </a:p>
@@ -1814,7 +1819,7 @@
           <a:p>
             <a:fld id="{3A33143C-BC35-4C3F-99A8-1253A60EB430}" type="datetimeFigureOut">
               <a:rPr lang="en-US" smtClean="0"/>
-              <a:t>3/8/2019</a:t>
+              <a:t>3/15/2019</a:t>
             </a:fld>
             <a:endParaRPr lang="en-US"/>
           </a:p>
@@ -2091,7 +2096,7 @@
           <a:p>
             <a:fld id="{3A33143C-BC35-4C3F-99A8-1253A60EB430}" type="datetimeFigureOut">
               <a:rPr lang="en-US" smtClean="0"/>
-              <a:t>3/8/2019</a:t>
+              <a:t>3/15/2019</a:t>
             </a:fld>
             <a:endParaRPr lang="en-US"/>
           </a:p>
@@ -2348,7 +2353,7 @@
           <a:p>
             <a:fld id="{3A33143C-BC35-4C3F-99A8-1253A60EB430}" type="datetimeFigureOut">
               <a:rPr lang="en-US" smtClean="0"/>
-              <a:t>3/8/2019</a:t>
+              <a:t>3/15/2019</a:t>
             </a:fld>
             <a:endParaRPr lang="en-US"/>
           </a:p>
@@ -2561,7 +2566,7 @@
           <a:p>
             <a:fld id="{3A33143C-BC35-4C3F-99A8-1253A60EB430}" type="datetimeFigureOut">
               <a:rPr lang="en-US" smtClean="0"/>
-              <a:t>3/8/2019</a:t>
+              <a:t>3/15/2019</a:t>
             </a:fld>
             <a:endParaRPr lang="en-US"/>
           </a:p>
@@ -2988,8 +2993,8 @@
         </p:nvSpPr>
         <p:spPr>
           <a:xfrm>
-            <a:off x="738444" y="6248698"/>
-            <a:ext cx="11901014" cy="13673981"/>
+            <a:off x="664275" y="6248696"/>
+            <a:ext cx="12286384" cy="25355252"/>
           </a:xfrm>
           <a:prstGeom prst="rect">
             <a:avLst/>
@@ -3042,8 +3047,8 @@
         </p:nvSpPr>
         <p:spPr>
           <a:xfrm>
-            <a:off x="738444" y="6252378"/>
-            <a:ext cx="11901014" cy="1471582"/>
+            <a:off x="697017" y="6252378"/>
+            <a:ext cx="12201863" cy="1312260"/>
           </a:xfrm>
           <a:prstGeom prst="rect">
             <a:avLst/>
@@ -3096,8 +3101,8 @@
         </p:nvSpPr>
         <p:spPr>
           <a:xfrm>
-            <a:off x="816253" y="6364309"/>
-            <a:ext cx="11773592" cy="1200329"/>
+            <a:off x="840816" y="6364309"/>
+            <a:ext cx="12030236" cy="1200329"/>
           </a:xfrm>
           <a:prstGeom prst="rect">
             <a:avLst/>
@@ -3177,14 +3182,14 @@
               </a:spcAft>
             </a:pPr>
             <a:r>
-              <a:rPr lang="en-US" altLang="en-US" sz="8000" dirty="0">
+              <a:rPr lang="en-US" altLang="en-US" sz="8000">
                 <a:ea typeface="Arial" charset="0"/>
                 <a:cs typeface="Arial" charset="0"/>
               </a:rPr>
               <a:t>Formic Acid gasified at 400</a:t>
             </a:r>
             <a:r>
-              <a:rPr lang="en-US" sz="8000" dirty="0"/>
+              <a:rPr lang="en-US" sz="8000"/>
               <a:t>°C</a:t>
             </a:r>
           </a:p>
@@ -3195,7 +3200,7 @@
               </a:spcAft>
             </a:pPr>
             <a:r>
-              <a:rPr lang="en-US" altLang="en-US" sz="8000" dirty="0">
+              <a:rPr lang="en-US" altLang="en-US" sz="8000">
                 <a:ea typeface="Arial" charset="0"/>
                 <a:cs typeface="Arial" charset="0"/>
               </a:rPr>
@@ -3209,23 +3214,12 @@
               </a:spcAft>
             </a:pPr>
             <a:r>
-              <a:rPr lang="en-US" altLang="en-US" sz="8000" dirty="0">
+              <a:rPr lang="en-US" altLang="en-US" sz="8000">
                 <a:ea typeface="Arial" charset="0"/>
                 <a:cs typeface="Arial" charset="0"/>
               </a:rPr>
-              <a:t>Residence time of </a:t>
-            </a:r>
-            <a:r>
-              <a:rPr lang="en-US" altLang="en-US" sz="8000" dirty="0" err="1">
-                <a:ea typeface="Arial" charset="0"/>
-                <a:cs typeface="Arial" charset="0"/>
-              </a:rPr>
-              <a:t>Xs</a:t>
-            </a:r>
-            <a:endParaRPr lang="en-US" altLang="en-US" sz="8000" dirty="0">
-              <a:ea typeface="Arial" charset="0"/>
-              <a:cs typeface="Arial" charset="0"/>
-            </a:endParaRPr>
+              <a:t>Residence time of Xs</a:t>
+            </a:r>
           </a:p>
           <a:p>
             <a:pPr marL="542913" indent="-411470" algn="just">
@@ -3234,40 +3228,16 @@
               </a:spcAft>
             </a:pPr>
             <a:r>
-              <a:rPr lang="en-US" altLang="en-US" sz="8000" dirty="0">
+              <a:rPr lang="en-US" altLang="en-US" sz="8000">
                 <a:ea typeface="Arial" charset="0"/>
                 <a:cs typeface="Arial" charset="0"/>
               </a:rPr>
-              <a:t>Constant </a:t>
-            </a:r>
-            <a:r>
-              <a:rPr lang="en-US" altLang="en-US" sz="8000" dirty="0" err="1">
-                <a:ea typeface="Arial" charset="0"/>
-                <a:cs typeface="Arial" charset="0"/>
-              </a:rPr>
-              <a:t>fedstock</a:t>
-            </a:r>
-            <a:r>
-              <a:rPr lang="en-US" altLang="en-US" sz="8000" dirty="0">
-                <a:ea typeface="Arial" charset="0"/>
-                <a:cs typeface="Arial" charset="0"/>
-              </a:rPr>
-              <a:t> concentration of 15 </a:t>
-            </a:r>
-            <a:r>
-              <a:rPr lang="en-US" altLang="en-US" sz="8000" dirty="0" err="1">
-                <a:ea typeface="Arial" charset="0"/>
-                <a:cs typeface="Arial" charset="0"/>
-              </a:rPr>
-              <a:t>wt</a:t>
-            </a:r>
-            <a:r>
-              <a:rPr lang="en-US" altLang="en-US" sz="8000" dirty="0">
-                <a:ea typeface="Arial" charset="0"/>
-                <a:cs typeface="Arial" charset="0"/>
-              </a:rPr>
-              <a:t>%</a:t>
-            </a:r>
+              <a:t>Constant fedstock concentration of 15 wt%</a:t>
+            </a:r>
+            <a:endParaRPr lang="en-US" altLang="en-US" sz="8000" dirty="0">
+              <a:ea typeface="Arial" charset="0"/>
+              <a:cs typeface="Arial" charset="0"/>
+            </a:endParaRPr>
           </a:p>
         </p:txBody>
       </p:sp>
@@ -3379,8 +3349,8 @@
         </p:nvSpPr>
         <p:spPr>
           <a:xfrm>
-            <a:off x="31251744" y="6248697"/>
-            <a:ext cx="12216469" cy="14483064"/>
+            <a:off x="31251744" y="6248696"/>
+            <a:ext cx="12216469" cy="25114095"/>
           </a:xfrm>
           <a:prstGeom prst="rect">
             <a:avLst/>
@@ -3520,10 +3490,10 @@
       </p:sp>
       <p:sp>
         <p:nvSpPr>
-          <p:cNvPr id="14" name="Rectangle 13">
+          <p:cNvPr id="15" name="Rectangle 14">
             <a:extLst>
               <a:ext uri="{FF2B5EF4-FFF2-40B4-BE49-F238E27FC236}">
-                <a16:creationId xmlns:a16="http://schemas.microsoft.com/office/drawing/2014/main" id="{8C70B316-B70D-4253-A967-B9EEF54C682A}"/>
+                <a16:creationId xmlns:a16="http://schemas.microsoft.com/office/drawing/2014/main" id="{F1D840E8-AC2A-467A-B85A-A684B7247247}"/>
               </a:ext>
             </a:extLst>
           </p:cNvPr>
@@ -3532,14 +3502,14 @@
         </p:nvSpPr>
         <p:spPr>
           <a:xfrm>
-            <a:off x="693701" y="20414728"/>
-            <a:ext cx="12216469" cy="5990021"/>
+            <a:off x="653923" y="17238956"/>
+            <a:ext cx="12286383" cy="1312260"/>
           </a:xfrm>
           <a:prstGeom prst="rect">
             <a:avLst/>
           </a:prstGeom>
           <a:solidFill>
-            <a:schemeClr val="bg1"/>
+            <a:srgbClr val="4B2D85"/>
           </a:solidFill>
           <a:ln w="38100">
             <a:solidFill>
@@ -3568,16 +3538,56 @@
           <a:lstStyle/>
           <a:p>
             <a:pPr algn="ctr"/>
-            <a:endParaRPr lang="en-US" sz="7824" dirty="0"/>
-          </a:p>
-        </p:txBody>
-      </p:sp>
-      <p:sp>
-        <p:nvSpPr>
-          <p:cNvPr id="15" name="Rectangle 14">
+            <a:endParaRPr lang="en-US" sz="7824"/>
+          </a:p>
+        </p:txBody>
+      </p:sp>
+      <p:sp>
+        <p:nvSpPr>
+          <p:cNvPr id="16" name="TextBox 15">
             <a:extLst>
               <a:ext uri="{FF2B5EF4-FFF2-40B4-BE49-F238E27FC236}">
-                <a16:creationId xmlns:a16="http://schemas.microsoft.com/office/drawing/2014/main" id="{F1D840E8-AC2A-467A-B85A-A684B7247247}"/>
+                <a16:creationId xmlns:a16="http://schemas.microsoft.com/office/drawing/2014/main" id="{067C311C-FDC4-4A40-B91D-C3C2B0160206}"/>
+              </a:ext>
+            </a:extLst>
+          </p:cNvPr>
+          <p:cNvSpPr txBox="1"/>
+          <p:nvPr/>
+        </p:nvSpPr>
+        <p:spPr>
+          <a:xfrm>
+            <a:off x="779869" y="17350887"/>
+            <a:ext cx="12030237" cy="1200329"/>
+          </a:xfrm>
+          <a:prstGeom prst="rect">
+            <a:avLst/>
+          </a:prstGeom>
+          <a:noFill/>
+        </p:spPr>
+        <p:txBody>
+          <a:bodyPr wrap="square" rtlCol="0">
+            <a:spAutoFit/>
+          </a:bodyPr>
+          <a:lstStyle/>
+          <a:p>
+            <a:pPr algn="ctr"/>
+            <a:r>
+              <a:rPr lang="en-US" sz="7200" dirty="0">
+                <a:solidFill>
+                  <a:schemeClr val="bg1"/>
+                </a:solidFill>
+              </a:rPr>
+              <a:t> Motivation</a:t>
+            </a:r>
+          </a:p>
+        </p:txBody>
+      </p:sp>
+      <p:sp>
+        <p:nvSpPr>
+          <p:cNvPr id="19" name="Rectangle 18">
+            <a:extLst>
+              <a:ext uri="{FF2B5EF4-FFF2-40B4-BE49-F238E27FC236}">
+                <a16:creationId xmlns:a16="http://schemas.microsoft.com/office/drawing/2014/main" id="{F5439794-21F3-40DA-A756-3C1A6ADB02A8}"/>
               </a:ext>
             </a:extLst>
           </p:cNvPr>
@@ -3586,8 +3596,8 @@
         </p:nvSpPr>
         <p:spPr>
           <a:xfrm>
-            <a:off x="705276" y="20418409"/>
-            <a:ext cx="12216469" cy="1615422"/>
+            <a:off x="31205403" y="21268628"/>
+            <a:ext cx="12216469" cy="1204541"/>
           </a:xfrm>
           <a:prstGeom prst="rect">
             <a:avLst/>
@@ -3628,10 +3638,10 @@
       </p:sp>
       <p:sp>
         <p:nvSpPr>
-          <p:cNvPr id="16" name="TextBox 15">
+          <p:cNvPr id="20" name="TextBox 19">
             <a:extLst>
               <a:ext uri="{FF2B5EF4-FFF2-40B4-BE49-F238E27FC236}">
-                <a16:creationId xmlns:a16="http://schemas.microsoft.com/office/drawing/2014/main" id="{067C311C-FDC4-4A40-B91D-C3C2B0160206}"/>
+                <a16:creationId xmlns:a16="http://schemas.microsoft.com/office/drawing/2014/main" id="{E2CD1A30-6002-4F36-95D9-F94E44A39221}"/>
               </a:ext>
             </a:extLst>
           </p:cNvPr>
@@ -3640,7 +3650,7 @@
         </p:nvSpPr>
         <p:spPr>
           <a:xfrm>
-            <a:off x="702060" y="20530340"/>
+            <a:off x="31283212" y="21380559"/>
             <a:ext cx="12085669" cy="1200329"/>
           </a:xfrm>
           <a:prstGeom prst="rect">
@@ -3661,17 +3671,17 @@
                   <a:schemeClr val="bg1"/>
                 </a:solidFill>
               </a:rPr>
-              <a:t> Motivation</a:t>
-            </a:r>
-          </a:p>
-        </p:txBody>
-      </p:sp>
-      <p:sp>
-        <p:nvSpPr>
-          <p:cNvPr id="17" name="TextBox 16">
+              <a:t> Conclusions and Future Work</a:t>
+            </a:r>
+          </a:p>
+        </p:txBody>
+      </p:sp>
+      <p:sp>
+        <p:nvSpPr>
+          <p:cNvPr id="21" name="TextBox 20">
             <a:extLst>
               <a:ext uri="{FF2B5EF4-FFF2-40B4-BE49-F238E27FC236}">
-                <a16:creationId xmlns:a16="http://schemas.microsoft.com/office/drawing/2014/main" id="{6E99862F-0AEE-4667-B1E2-3ADDE8575366}"/>
+                <a16:creationId xmlns:a16="http://schemas.microsoft.com/office/drawing/2014/main" id="{024B80CA-0F3D-4F27-A3C8-5296DD25E8FF}"/>
               </a:ext>
             </a:extLst>
           </p:cNvPr>
@@ -3680,8 +3690,8 @@
         </p:nvSpPr>
         <p:spPr>
           <a:xfrm>
-            <a:off x="835510" y="22127040"/>
-            <a:ext cx="12455173" cy="954107"/>
+            <a:off x="31308847" y="22718611"/>
+            <a:ext cx="12085669" cy="3539430"/>
           </a:xfrm>
           <a:prstGeom prst="rect">
             <a:avLst/>
@@ -3701,23 +3711,48 @@
             </a:pPr>
             <a:r>
               <a:rPr lang="en-US" sz="2800" dirty="0"/>
-              <a:t>Fill in</a:t>
+              <a:t>x</a:t>
             </a:r>
           </a:p>
           <a:p>
             <a:pPr defTabSz="985803">
               <a:defRPr/>
             </a:pPr>
-            <a:endParaRPr lang="en-US" sz="2800" dirty="0"/>
-          </a:p>
-        </p:txBody>
-      </p:sp>
-      <p:sp>
-        <p:nvSpPr>
-          <p:cNvPr id="18" name="Rectangle 17">
+            <a:r>
+              <a:rPr lang="en-US" sz="2800" u="sng" dirty="0"/>
+              <a:t>Future work is focused on:</a:t>
+            </a:r>
+          </a:p>
+          <a:p>
+            <a:pPr marL="1473200" lvl="1" indent="-514350" defTabSz="985803">
+              <a:buFont typeface="+mj-lt"/>
+              <a:buAutoNum type="arabicPeriod"/>
+              <a:defRPr/>
+            </a:pPr>
+            <a:r>
+              <a:rPr lang="en-US" sz="2800" dirty="0"/>
+              <a:t>Expand software to be able to compute decomposition rates across varying parameters such as temperature, resonance time, possibly pressure.</a:t>
+            </a:r>
+          </a:p>
+          <a:p>
+            <a:pPr marL="1473200" lvl="1" indent="-514350" defTabSz="985803">
+              <a:buFont typeface="+mj-lt"/>
+              <a:buAutoNum type="arabicPeriod"/>
+              <a:defRPr/>
+            </a:pPr>
+            <a:r>
+              <a:rPr lang="en-US" sz="2800" dirty="0"/>
+              <a:t>From the defined decomposition rate the software can predict the decomposition rates using machine learning beyond the known data set limits</a:t>
+            </a:r>
+          </a:p>
+        </p:txBody>
+      </p:sp>
+      <p:sp>
+        <p:nvSpPr>
+          <p:cNvPr id="23" name="Rectangle 22">
             <a:extLst>
               <a:ext uri="{FF2B5EF4-FFF2-40B4-BE49-F238E27FC236}">
-                <a16:creationId xmlns:a16="http://schemas.microsoft.com/office/drawing/2014/main" id="{6523282A-982C-4E09-9357-449709209036}"/>
+                <a16:creationId xmlns:a16="http://schemas.microsoft.com/office/drawing/2014/main" id="{A001F368-4B42-4E2D-93A9-47063E027FB1}"/>
               </a:ext>
             </a:extLst>
           </p:cNvPr>
@@ -3726,14 +3761,14 @@
         </p:nvSpPr>
         <p:spPr>
           <a:xfrm>
-            <a:off x="31205403" y="21264948"/>
-            <a:ext cx="12216469" cy="4248653"/>
+            <a:off x="31241391" y="26679552"/>
+            <a:ext cx="12216469" cy="1615422"/>
           </a:xfrm>
           <a:prstGeom prst="rect">
             <a:avLst/>
           </a:prstGeom>
           <a:solidFill>
-            <a:schemeClr val="bg1"/>
+            <a:srgbClr val="4B2D85"/>
           </a:solidFill>
           <a:ln w="38100">
             <a:solidFill>
@@ -3762,16 +3797,208 @@
           <a:lstStyle/>
           <a:p>
             <a:pPr algn="ctr"/>
-            <a:endParaRPr lang="en-US" sz="7824" dirty="0"/>
-          </a:p>
-        </p:txBody>
-      </p:sp>
-      <p:sp>
-        <p:nvSpPr>
-          <p:cNvPr id="19" name="Rectangle 18">
+            <a:endParaRPr lang="en-US" sz="7824"/>
+          </a:p>
+        </p:txBody>
+      </p:sp>
+      <p:sp>
+        <p:nvSpPr>
+          <p:cNvPr id="24" name="TextBox 23">
             <a:extLst>
               <a:ext uri="{FF2B5EF4-FFF2-40B4-BE49-F238E27FC236}">
-                <a16:creationId xmlns:a16="http://schemas.microsoft.com/office/drawing/2014/main" id="{F5439794-21F3-40DA-A756-3C1A6ADB02A8}"/>
+                <a16:creationId xmlns:a16="http://schemas.microsoft.com/office/drawing/2014/main" id="{084D5643-41F5-4E5C-AB53-730272C9CAF9}"/>
+              </a:ext>
+            </a:extLst>
+          </p:cNvPr>
+          <p:cNvSpPr txBox="1"/>
+          <p:nvPr/>
+        </p:nvSpPr>
+        <p:spPr>
+          <a:xfrm>
+            <a:off x="31319200" y="26791483"/>
+            <a:ext cx="12085669" cy="1200329"/>
+          </a:xfrm>
+          <a:prstGeom prst="rect">
+            <a:avLst/>
+          </a:prstGeom>
+          <a:noFill/>
+        </p:spPr>
+        <p:txBody>
+          <a:bodyPr wrap="square" rtlCol="0">
+            <a:spAutoFit/>
+          </a:bodyPr>
+          <a:lstStyle/>
+          <a:p>
+            <a:pPr algn="ctr"/>
+            <a:r>
+              <a:rPr lang="en-US" sz="7200" dirty="0">
+                <a:solidFill>
+                  <a:schemeClr val="bg1"/>
+                </a:solidFill>
+              </a:rPr>
+              <a:t> Acknowledgements</a:t>
+            </a:r>
+          </a:p>
+        </p:txBody>
+      </p:sp>
+      <p:sp>
+        <p:nvSpPr>
+          <p:cNvPr id="25" name="TextBox 24">
+            <a:extLst>
+              <a:ext uri="{FF2B5EF4-FFF2-40B4-BE49-F238E27FC236}">
+                <a16:creationId xmlns:a16="http://schemas.microsoft.com/office/drawing/2014/main" id="{CFFC2CBE-1617-4D58-A7DB-93279A49A1D2}"/>
+              </a:ext>
+            </a:extLst>
+          </p:cNvPr>
+          <p:cNvSpPr txBox="1"/>
+          <p:nvPr/>
+        </p:nvSpPr>
+        <p:spPr>
+          <a:xfrm>
+            <a:off x="31330871" y="28323109"/>
+            <a:ext cx="12038010" cy="3108543"/>
+          </a:xfrm>
+          <a:prstGeom prst="rect">
+            <a:avLst/>
+          </a:prstGeom>
+          <a:noFill/>
+        </p:spPr>
+        <p:txBody>
+          <a:bodyPr wrap="square" rtlCol="0">
+            <a:spAutoFit/>
+          </a:bodyPr>
+          <a:lstStyle/>
+          <a:p>
+            <a:pPr marL="457200" indent="-457200" algn="just">
+              <a:buFont typeface="Arial" panose="020B0604020202020204" pitchFamily="34" charset="0"/>
+              <a:buChar char="•"/>
+            </a:pPr>
+            <a:r>
+              <a:rPr lang="en-US" sz="2800" dirty="0"/>
+              <a:t>Dave Beck, Chad Curtis, and Kelly Thornton</a:t>
+            </a:r>
+          </a:p>
+          <a:p>
+            <a:pPr marL="457200" indent="-457200" algn="just">
+              <a:buFont typeface="Arial" panose="020B0604020202020204" pitchFamily="34" charset="0"/>
+              <a:buChar char="•"/>
+            </a:pPr>
+            <a:r>
+              <a:rPr lang="en-US" sz="2800" dirty="0"/>
+              <a:t>Data sets were taken from publicly available from the NIST </a:t>
+            </a:r>
+            <a:r>
+              <a:rPr lang="en-US" sz="2800" dirty="0" err="1"/>
+              <a:t>WebBook</a:t>
+            </a:r>
+            <a:r>
+              <a:rPr lang="en-US" sz="2800" dirty="0"/>
+              <a:t> Database and Mendeley Data, “Raman Spectra of Formic Acid Gasification Products in Subcritical and Supercritical Water”</a:t>
+            </a:r>
+          </a:p>
+          <a:p>
+            <a:pPr marL="457200" indent="-457200" algn="just">
+              <a:buFont typeface="Arial" panose="020B0604020202020204" pitchFamily="34" charset="0"/>
+              <a:buChar char="•"/>
+            </a:pPr>
+            <a:r>
+              <a:rPr lang="en-US" sz="2800" dirty="0"/>
+              <a:t>Only open source packages were used in this work, documentation of all packages used can be found at our </a:t>
+            </a:r>
+            <a:r>
+              <a:rPr lang="en-US" sz="2800" dirty="0" err="1"/>
+              <a:t>Github</a:t>
+            </a:r>
+            <a:r>
+              <a:rPr lang="en-US" sz="2800" dirty="0"/>
+              <a:t> at:</a:t>
+            </a:r>
+          </a:p>
+          <a:p>
+            <a:pPr marL="1371600" lvl="2" indent="-457200" algn="just">
+              <a:buFont typeface="Arial" panose="020B0604020202020204" pitchFamily="34" charset="0"/>
+              <a:buChar char="•"/>
+            </a:pPr>
+            <a:r>
+              <a:rPr lang="en-US" sz="2800" dirty="0"/>
+              <a:t> https://github.com/raman-noodles</a:t>
+            </a:r>
+          </a:p>
+        </p:txBody>
+      </p:sp>
+      <p:sp>
+        <p:nvSpPr>
+          <p:cNvPr id="26" name="TextBox 25">
+            <a:extLst>
+              <a:ext uri="{FF2B5EF4-FFF2-40B4-BE49-F238E27FC236}">
+                <a16:creationId xmlns:a16="http://schemas.microsoft.com/office/drawing/2014/main" id="{515E4271-3185-488C-9E02-D852D184C9F2}"/>
+              </a:ext>
+            </a:extLst>
+          </p:cNvPr>
+          <p:cNvSpPr txBox="1"/>
+          <p:nvPr/>
+        </p:nvSpPr>
+        <p:spPr>
+          <a:xfrm>
+            <a:off x="31434244" y="7959986"/>
+            <a:ext cx="11728724" cy="1056700"/>
+          </a:xfrm>
+          <a:prstGeom prst="rect">
+            <a:avLst/>
+          </a:prstGeom>
+          <a:noFill/>
+        </p:spPr>
+        <p:txBody>
+          <a:bodyPr wrap="square" rtlCol="0">
+            <a:spAutoFit/>
+          </a:bodyPr>
+          <a:lstStyle/>
+          <a:p>
+            <a:pPr marL="131443" algn="ctr">
+              <a:spcAft>
+                <a:spcPts val="800"/>
+              </a:spcAft>
+            </a:pPr>
+            <a:r>
+              <a:rPr lang="en-US" sz="2800" u="sng" dirty="0">
+                <a:solidFill>
+                  <a:srgbClr val="623E92"/>
+                </a:solidFill>
+                <a:latin typeface="Arial Black" panose="020B0A04020102020204" pitchFamily="34" charset="0"/>
+              </a:rPr>
+              <a:t>Component Analysis in a Mixture Raman Signal</a:t>
+            </a:r>
+            <a:endParaRPr lang="en-US" altLang="en-US" sz="2800" u="sng" dirty="0">
+              <a:latin typeface="Arial" charset="0"/>
+              <a:ea typeface="Arial" charset="0"/>
+              <a:cs typeface="Arial" charset="0"/>
+            </a:endParaRPr>
+          </a:p>
+          <a:p>
+            <a:pPr marL="542913" indent="-411470" algn="just">
+              <a:spcAft>
+                <a:spcPts val="800"/>
+              </a:spcAft>
+              <a:buFont typeface="Arial" panose="020B0604020202020204" pitchFamily="34" charset="0"/>
+              <a:buChar char="•"/>
+            </a:pPr>
+            <a:r>
+              <a:rPr lang="en-US" altLang="en-US" sz="2800" dirty="0">
+                <a:ea typeface="Arial" charset="0"/>
+                <a:cs typeface="Arial" charset="0"/>
+              </a:rPr>
+              <a:t>[text to be filled in at meeting]</a:t>
+            </a:r>
+            <a:endParaRPr lang="en-US" sz="2800" dirty="0"/>
+          </a:p>
+        </p:txBody>
+      </p:sp>
+      <p:sp>
+        <p:nvSpPr>
+          <p:cNvPr id="28" name="Rectangle 27">
+            <a:extLst>
+              <a:ext uri="{FF2B5EF4-FFF2-40B4-BE49-F238E27FC236}">
+                <a16:creationId xmlns:a16="http://schemas.microsoft.com/office/drawing/2014/main" id="{27988FE1-82FC-4E6B-BA63-82208198C461}"/>
               </a:ext>
             </a:extLst>
           </p:cNvPr>
@@ -3780,8 +4007,8 @@
         </p:nvSpPr>
         <p:spPr>
           <a:xfrm>
-            <a:off x="31205403" y="21268628"/>
-            <a:ext cx="12216469" cy="1204541"/>
+            <a:off x="697017" y="26417879"/>
+            <a:ext cx="12243289" cy="1263619"/>
           </a:xfrm>
           <a:prstGeom prst="rect">
             <a:avLst/>
@@ -3822,553 +4049,6 @@
       </p:sp>
       <p:sp>
         <p:nvSpPr>
-          <p:cNvPr id="20" name="TextBox 19">
-            <a:extLst>
-              <a:ext uri="{FF2B5EF4-FFF2-40B4-BE49-F238E27FC236}">
-                <a16:creationId xmlns:a16="http://schemas.microsoft.com/office/drawing/2014/main" id="{E2CD1A30-6002-4F36-95D9-F94E44A39221}"/>
-              </a:ext>
-            </a:extLst>
-          </p:cNvPr>
-          <p:cNvSpPr txBox="1"/>
-          <p:nvPr/>
-        </p:nvSpPr>
-        <p:spPr>
-          <a:xfrm>
-            <a:off x="31283212" y="21380559"/>
-            <a:ext cx="12085669" cy="1200329"/>
-          </a:xfrm>
-          <a:prstGeom prst="rect">
-            <a:avLst/>
-          </a:prstGeom>
-          <a:noFill/>
-        </p:spPr>
-        <p:txBody>
-          <a:bodyPr wrap="square" rtlCol="0">
-            <a:spAutoFit/>
-          </a:bodyPr>
-          <a:lstStyle/>
-          <a:p>
-            <a:pPr algn="ctr"/>
-            <a:r>
-              <a:rPr lang="en-US" sz="7200" dirty="0">
-                <a:solidFill>
-                  <a:schemeClr val="bg1"/>
-                </a:solidFill>
-              </a:rPr>
-              <a:t> Conclusions and Future Work</a:t>
-            </a:r>
-          </a:p>
-        </p:txBody>
-      </p:sp>
-      <p:sp>
-        <p:nvSpPr>
-          <p:cNvPr id="21" name="TextBox 20">
-            <a:extLst>
-              <a:ext uri="{FF2B5EF4-FFF2-40B4-BE49-F238E27FC236}">
-                <a16:creationId xmlns:a16="http://schemas.microsoft.com/office/drawing/2014/main" id="{024B80CA-0F3D-4F27-A3C8-5296DD25E8FF}"/>
-              </a:ext>
-            </a:extLst>
-          </p:cNvPr>
-          <p:cNvSpPr txBox="1"/>
-          <p:nvPr/>
-        </p:nvSpPr>
-        <p:spPr>
-          <a:xfrm>
-            <a:off x="31308847" y="22718611"/>
-            <a:ext cx="11958813" cy="1538883"/>
-          </a:xfrm>
-          <a:prstGeom prst="rect">
-            <a:avLst/>
-          </a:prstGeom>
-          <a:noFill/>
-        </p:spPr>
-        <p:txBody>
-          <a:bodyPr wrap="square" rtlCol="0">
-            <a:spAutoFit/>
-          </a:bodyPr>
-          <a:lstStyle/>
-          <a:p>
-            <a:pPr marL="369677" indent="-369677" defTabSz="985803">
-              <a:buFont typeface="Arial" charset="0"/>
-              <a:buChar char="•"/>
-              <a:defRPr/>
-            </a:pPr>
-            <a:r>
-              <a:rPr lang="en-US" sz="3100" dirty="0"/>
-              <a:t>x</a:t>
-            </a:r>
-          </a:p>
-          <a:p>
-            <a:pPr defTabSz="985803">
-              <a:defRPr/>
-            </a:pPr>
-            <a:r>
-              <a:rPr lang="en-US" sz="3200" u="sng" dirty="0"/>
-              <a:t>Future work is focused on:</a:t>
-            </a:r>
-          </a:p>
-          <a:p>
-            <a:pPr marL="1473200" lvl="1" indent="-514350" defTabSz="985803">
-              <a:buFont typeface="+mj-lt"/>
-              <a:buAutoNum type="arabicPeriod"/>
-              <a:defRPr/>
-            </a:pPr>
-            <a:r>
-              <a:rPr lang="en-US" sz="3100" dirty="0"/>
-              <a:t>Defining s</a:t>
-            </a:r>
-          </a:p>
-        </p:txBody>
-      </p:sp>
-      <p:sp>
-        <p:nvSpPr>
-          <p:cNvPr id="22" name="Rectangle 21">
-            <a:extLst>
-              <a:ext uri="{FF2B5EF4-FFF2-40B4-BE49-F238E27FC236}">
-                <a16:creationId xmlns:a16="http://schemas.microsoft.com/office/drawing/2014/main" id="{4353CABB-B828-46A2-A637-FB3A246D0EF3}"/>
-              </a:ext>
-            </a:extLst>
-          </p:cNvPr>
-          <p:cNvSpPr/>
-          <p:nvPr/>
-        </p:nvSpPr>
-        <p:spPr>
-          <a:xfrm>
-            <a:off x="31241391" y="25761470"/>
-            <a:ext cx="12216469" cy="4744075"/>
-          </a:xfrm>
-          <a:prstGeom prst="rect">
-            <a:avLst/>
-          </a:prstGeom>
-          <a:solidFill>
-            <a:schemeClr val="bg1"/>
-          </a:solidFill>
-          <a:ln w="38100">
-            <a:solidFill>
-              <a:schemeClr val="tx1"/>
-            </a:solidFill>
-          </a:ln>
-        </p:spPr>
-        <p:style>
-          <a:lnRef idx="2">
-            <a:schemeClr val="accent1">
-              <a:shade val="50000"/>
-            </a:schemeClr>
-          </a:lnRef>
-          <a:fillRef idx="1">
-            <a:schemeClr val="accent1"/>
-          </a:fillRef>
-          <a:effectRef idx="0">
-            <a:schemeClr val="accent1"/>
-          </a:effectRef>
-          <a:fontRef idx="minor">
-            <a:schemeClr val="lt1"/>
-          </a:fontRef>
-        </p:style>
-        <p:txBody>
-          <a:bodyPr rtlCol="0" anchor="ctr"/>
-          <a:lstStyle/>
-          <a:p>
-            <a:pPr algn="ctr"/>
-            <a:endParaRPr lang="en-US" sz="7824" dirty="0"/>
-          </a:p>
-        </p:txBody>
-      </p:sp>
-      <p:sp>
-        <p:nvSpPr>
-          <p:cNvPr id="23" name="Rectangle 22">
-            <a:extLst>
-              <a:ext uri="{FF2B5EF4-FFF2-40B4-BE49-F238E27FC236}">
-                <a16:creationId xmlns:a16="http://schemas.microsoft.com/office/drawing/2014/main" id="{A001F368-4B42-4E2D-93A9-47063E027FB1}"/>
-              </a:ext>
-            </a:extLst>
-          </p:cNvPr>
-          <p:cNvSpPr/>
-          <p:nvPr/>
-        </p:nvSpPr>
-        <p:spPr>
-          <a:xfrm>
-            <a:off x="31241391" y="25765152"/>
-            <a:ext cx="12216469" cy="1615422"/>
-          </a:xfrm>
-          <a:prstGeom prst="rect">
-            <a:avLst/>
-          </a:prstGeom>
-          <a:solidFill>
-            <a:srgbClr val="4B2D85"/>
-          </a:solidFill>
-          <a:ln w="38100">
-            <a:solidFill>
-              <a:schemeClr val="tx1"/>
-            </a:solidFill>
-          </a:ln>
-        </p:spPr>
-        <p:style>
-          <a:lnRef idx="2">
-            <a:schemeClr val="accent1">
-              <a:shade val="50000"/>
-            </a:schemeClr>
-          </a:lnRef>
-          <a:fillRef idx="1">
-            <a:schemeClr val="accent1"/>
-          </a:fillRef>
-          <a:effectRef idx="0">
-            <a:schemeClr val="accent1"/>
-          </a:effectRef>
-          <a:fontRef idx="minor">
-            <a:schemeClr val="lt1"/>
-          </a:fontRef>
-        </p:style>
-        <p:txBody>
-          <a:bodyPr rtlCol="0" anchor="ctr"/>
-          <a:lstStyle/>
-          <a:p>
-            <a:pPr algn="ctr"/>
-            <a:endParaRPr lang="en-US" sz="7824"/>
-          </a:p>
-        </p:txBody>
-      </p:sp>
-      <p:sp>
-        <p:nvSpPr>
-          <p:cNvPr id="24" name="TextBox 23">
-            <a:extLst>
-              <a:ext uri="{FF2B5EF4-FFF2-40B4-BE49-F238E27FC236}">
-                <a16:creationId xmlns:a16="http://schemas.microsoft.com/office/drawing/2014/main" id="{084D5643-41F5-4E5C-AB53-730272C9CAF9}"/>
-              </a:ext>
-            </a:extLst>
-          </p:cNvPr>
-          <p:cNvSpPr txBox="1"/>
-          <p:nvPr/>
-        </p:nvSpPr>
-        <p:spPr>
-          <a:xfrm>
-            <a:off x="31319200" y="25877083"/>
-            <a:ext cx="12085669" cy="1200329"/>
-          </a:xfrm>
-          <a:prstGeom prst="rect">
-            <a:avLst/>
-          </a:prstGeom>
-          <a:noFill/>
-        </p:spPr>
-        <p:txBody>
-          <a:bodyPr wrap="square" rtlCol="0">
-            <a:spAutoFit/>
-          </a:bodyPr>
-          <a:lstStyle/>
-          <a:p>
-            <a:pPr algn="ctr"/>
-            <a:r>
-              <a:rPr lang="en-US" sz="7200" dirty="0">
-                <a:solidFill>
-                  <a:schemeClr val="bg1"/>
-                </a:solidFill>
-              </a:rPr>
-              <a:t> Acknowledgements</a:t>
-            </a:r>
-          </a:p>
-        </p:txBody>
-      </p:sp>
-      <p:sp>
-        <p:nvSpPr>
-          <p:cNvPr id="25" name="TextBox 24">
-            <a:extLst>
-              <a:ext uri="{FF2B5EF4-FFF2-40B4-BE49-F238E27FC236}">
-                <a16:creationId xmlns:a16="http://schemas.microsoft.com/office/drawing/2014/main" id="{CFFC2CBE-1617-4D58-A7DB-93279A49A1D2}"/>
-              </a:ext>
-            </a:extLst>
-          </p:cNvPr>
-          <p:cNvSpPr txBox="1"/>
-          <p:nvPr/>
-        </p:nvSpPr>
-        <p:spPr>
-          <a:xfrm>
-            <a:off x="31374828" y="27662297"/>
-            <a:ext cx="12019688" cy="2246769"/>
-          </a:xfrm>
-          <a:prstGeom prst="rect">
-            <a:avLst/>
-          </a:prstGeom>
-          <a:noFill/>
-        </p:spPr>
-        <p:txBody>
-          <a:bodyPr wrap="square" rtlCol="0">
-            <a:spAutoFit/>
-          </a:bodyPr>
-          <a:lstStyle/>
-          <a:p>
-            <a:pPr algn="just"/>
-            <a:r>
-              <a:rPr lang="en-US" sz="2800" dirty="0" err="1"/>
-              <a:t>DaveBeckandKellyThornton</a:t>
-            </a:r>
-            <a:endParaRPr lang="en-US" sz="2800" dirty="0"/>
-          </a:p>
-          <a:p>
-            <a:pPr algn="just"/>
-            <a:r>
-              <a:rPr lang="en-US" sz="2800" dirty="0"/>
-              <a:t>DatasetsweretakenfrompublicallyavailablebatterycyclingdatafromtheUniversityofMaryland’sCenterforAdvancedLifeCycleEngineering(CALCE)Onlyopensourcepackageswereusedinthiswork,documentationofallpackagesusedcanbefoundatourgithubathttps://github.com/tacohen125/</a:t>
-            </a:r>
-            <a:r>
-              <a:rPr lang="en-US" sz="2800" dirty="0" err="1"/>
-              <a:t>chachies</a:t>
-            </a:r>
-            <a:endParaRPr lang="en-US" sz="2800" dirty="0"/>
-          </a:p>
-        </p:txBody>
-      </p:sp>
-      <p:sp>
-        <p:nvSpPr>
-          <p:cNvPr id="26" name="TextBox 25">
-            <a:extLst>
-              <a:ext uri="{FF2B5EF4-FFF2-40B4-BE49-F238E27FC236}">
-                <a16:creationId xmlns:a16="http://schemas.microsoft.com/office/drawing/2014/main" id="{515E4271-3185-488C-9E02-D852D184C9F2}"/>
-              </a:ext>
-            </a:extLst>
-          </p:cNvPr>
-          <p:cNvSpPr txBox="1"/>
-          <p:nvPr/>
-        </p:nvSpPr>
-        <p:spPr>
-          <a:xfrm>
-            <a:off x="31434244" y="7959986"/>
-            <a:ext cx="11728724" cy="3518912"/>
-          </a:xfrm>
-          <a:prstGeom prst="rect">
-            <a:avLst/>
-          </a:prstGeom>
-          <a:noFill/>
-        </p:spPr>
-        <p:txBody>
-          <a:bodyPr wrap="square" rtlCol="0">
-            <a:spAutoFit/>
-          </a:bodyPr>
-          <a:lstStyle/>
-          <a:p>
-            <a:pPr marL="131443" algn="ctr">
-              <a:spcAft>
-                <a:spcPts val="800"/>
-              </a:spcAft>
-            </a:pPr>
-            <a:r>
-              <a:rPr lang="en-US" sz="2800" u="sng" dirty="0">
-                <a:solidFill>
-                  <a:srgbClr val="623E92"/>
-                </a:solidFill>
-                <a:latin typeface="Arial Black" panose="020B0A04020102020204" pitchFamily="34" charset="0"/>
-              </a:rPr>
-              <a:t>Raman Analysis</a:t>
-            </a:r>
-            <a:endParaRPr lang="en-US" altLang="en-US" sz="2800" u="sng" dirty="0">
-              <a:latin typeface="Arial" charset="0"/>
-              <a:ea typeface="Arial" charset="0"/>
-              <a:cs typeface="Arial" charset="0"/>
-            </a:endParaRPr>
-          </a:p>
-          <a:p>
-            <a:pPr marL="542913" indent="-411470" algn="just">
-              <a:spcAft>
-                <a:spcPts val="800"/>
-              </a:spcAft>
-              <a:buFont typeface="Arial" panose="020B0604020202020204" pitchFamily="34" charset="0"/>
-              <a:buChar char="•"/>
-            </a:pPr>
-            <a:r>
-              <a:rPr lang="en-US" altLang="en-US" sz="2800" dirty="0">
-                <a:ea typeface="Arial" charset="0"/>
-                <a:cs typeface="Arial" charset="0"/>
-              </a:rPr>
-              <a:t>Decomposition hypothesized when presence of bubbles and vapor in product collection beaker was observed</a:t>
-            </a:r>
-          </a:p>
-          <a:p>
-            <a:pPr marL="542913" indent="-411470" algn="just">
-              <a:spcAft>
-                <a:spcPts val="800"/>
-              </a:spcAft>
-              <a:buFont typeface="Arial" panose="020B0604020202020204" pitchFamily="34" charset="0"/>
-              <a:buChar char="•"/>
-            </a:pPr>
-            <a:r>
-              <a:rPr lang="en-US" altLang="en-US" sz="2800" dirty="0">
-                <a:ea typeface="Arial" charset="0"/>
-                <a:cs typeface="Arial" charset="0"/>
-              </a:rPr>
-              <a:t>Raman laser (785 nm wavelength, 300 </a:t>
-            </a:r>
-            <a:r>
-              <a:rPr lang="en-US" altLang="en-US" sz="2800" dirty="0" err="1">
-                <a:ea typeface="Arial" charset="0"/>
-                <a:cs typeface="Arial" charset="0"/>
-              </a:rPr>
-              <a:t>mW</a:t>
-            </a:r>
-            <a:r>
-              <a:rPr lang="en-US" altLang="en-US" sz="2800" dirty="0">
-                <a:ea typeface="Arial" charset="0"/>
-                <a:cs typeface="Arial" charset="0"/>
-              </a:rPr>
-              <a:t> of power) with sapphire ball cell</a:t>
-            </a:r>
-          </a:p>
-          <a:p>
-            <a:pPr marL="542913" indent="-411470" algn="just">
-              <a:spcAft>
-                <a:spcPts val="800"/>
-              </a:spcAft>
-              <a:buFont typeface="Arial" panose="020B0604020202020204" pitchFamily="34" charset="0"/>
-              <a:buChar char="•"/>
-            </a:pPr>
-            <a:r>
-              <a:rPr lang="en-US" altLang="en-US" sz="2800" dirty="0">
-                <a:ea typeface="Arial" charset="0"/>
-                <a:cs typeface="Arial" charset="0"/>
-              </a:rPr>
-              <a:t>Fluorescent background signal removed with </a:t>
-            </a:r>
-            <a:r>
-              <a:rPr lang="en-US" altLang="en-US" sz="2800" dirty="0" err="1">
-                <a:ea typeface="Arial" charset="0"/>
-                <a:cs typeface="Arial" charset="0"/>
-              </a:rPr>
-              <a:t>OriginPro</a:t>
-            </a:r>
-            <a:r>
-              <a:rPr lang="en-US" altLang="en-US" sz="2800" dirty="0">
-                <a:ea typeface="Arial" charset="0"/>
-                <a:cs typeface="Arial" charset="0"/>
-              </a:rPr>
-              <a:t> Software</a:t>
-            </a:r>
-          </a:p>
-          <a:p>
-            <a:pPr marL="542913" indent="-411470" algn="just">
-              <a:spcAft>
-                <a:spcPts val="800"/>
-              </a:spcAft>
-              <a:buFont typeface="Arial" panose="020B0604020202020204" pitchFamily="34" charset="0"/>
-              <a:buChar char="•"/>
-            </a:pPr>
-            <a:r>
-              <a:rPr lang="en-US" sz="2800" dirty="0">
-                <a:cs typeface="Arial" charset="0"/>
-              </a:rPr>
-              <a:t>Compared to pure DMF signal, the collected Raman sample confirms decomposition of DMF</a:t>
-            </a:r>
-            <a:endParaRPr lang="en-US" sz="2800" dirty="0"/>
-          </a:p>
-        </p:txBody>
-      </p:sp>
-      <p:sp>
-        <p:nvSpPr>
-          <p:cNvPr id="27" name="Rectangle 26">
-            <a:extLst>
-              <a:ext uri="{FF2B5EF4-FFF2-40B4-BE49-F238E27FC236}">
-                <a16:creationId xmlns:a16="http://schemas.microsoft.com/office/drawing/2014/main" id="{7E0DA663-2EFD-4842-89D4-DF30932D8B71}"/>
-              </a:ext>
-            </a:extLst>
-          </p:cNvPr>
-          <p:cNvSpPr/>
-          <p:nvPr/>
-        </p:nvSpPr>
-        <p:spPr>
-          <a:xfrm>
-            <a:off x="693701" y="26896798"/>
-            <a:ext cx="12238246" cy="4486337"/>
-          </a:xfrm>
-          <a:prstGeom prst="rect">
-            <a:avLst/>
-          </a:prstGeom>
-          <a:solidFill>
-            <a:schemeClr val="bg1"/>
-          </a:solidFill>
-          <a:ln w="38100">
-            <a:solidFill>
-              <a:schemeClr val="tx1"/>
-            </a:solidFill>
-          </a:ln>
-        </p:spPr>
-        <p:style>
-          <a:lnRef idx="2">
-            <a:schemeClr val="accent1">
-              <a:shade val="50000"/>
-            </a:schemeClr>
-          </a:lnRef>
-          <a:fillRef idx="1">
-            <a:schemeClr val="accent1"/>
-          </a:fillRef>
-          <a:effectRef idx="0">
-            <a:schemeClr val="accent1"/>
-          </a:effectRef>
-          <a:fontRef idx="minor">
-            <a:schemeClr val="lt1"/>
-          </a:fontRef>
-        </p:style>
-        <p:txBody>
-          <a:bodyPr rtlCol="0" anchor="ctr"/>
-          <a:lstStyle/>
-          <a:p>
-            <a:pPr algn="ctr"/>
-            <a:endParaRPr lang="en-US" sz="7824" dirty="0"/>
-          </a:p>
-        </p:txBody>
-      </p:sp>
-      <p:sp>
-        <p:nvSpPr>
-          <p:cNvPr id="28" name="Rectangle 27">
-            <a:extLst>
-              <a:ext uri="{FF2B5EF4-FFF2-40B4-BE49-F238E27FC236}">
-                <a16:creationId xmlns:a16="http://schemas.microsoft.com/office/drawing/2014/main" id="{27988FE1-82FC-4E6B-BA63-82208198C461}"/>
-              </a:ext>
-            </a:extLst>
-          </p:cNvPr>
-          <p:cNvSpPr/>
-          <p:nvPr/>
-        </p:nvSpPr>
-        <p:spPr>
-          <a:xfrm>
-            <a:off x="693701" y="26900479"/>
-            <a:ext cx="12216469" cy="1615422"/>
-          </a:xfrm>
-          <a:prstGeom prst="rect">
-            <a:avLst/>
-          </a:prstGeom>
-          <a:solidFill>
-            <a:srgbClr val="4B2D85"/>
-          </a:solidFill>
-          <a:ln w="38100">
-            <a:solidFill>
-              <a:schemeClr val="tx1"/>
-            </a:solidFill>
-          </a:ln>
-        </p:spPr>
-        <p:style>
-          <a:lnRef idx="2">
-            <a:schemeClr val="accent1">
-              <a:shade val="50000"/>
-            </a:schemeClr>
-          </a:lnRef>
-          <a:fillRef idx="1">
-            <a:schemeClr val="accent1"/>
-          </a:fillRef>
-          <a:effectRef idx="0">
-            <a:schemeClr val="accent1"/>
-          </a:effectRef>
-          <a:fontRef idx="minor">
-            <a:schemeClr val="lt1"/>
-          </a:fontRef>
-        </p:style>
-        <p:txBody>
-          <a:bodyPr rtlCol="0" anchor="ctr"/>
-          <a:lstStyle/>
-          <a:p>
-            <a:pPr algn="ctr"/>
-            <a:endParaRPr lang="en-US" sz="7824"/>
-          </a:p>
-        </p:txBody>
-      </p:sp>
-      <p:sp>
-        <p:nvSpPr>
           <p:cNvPr id="29" name="TextBox 28">
             <a:extLst>
               <a:ext uri="{FF2B5EF4-FFF2-40B4-BE49-F238E27FC236}">
@@ -4381,7 +4061,7 @@
         </p:nvSpPr>
         <p:spPr>
           <a:xfrm>
-            <a:off x="771510" y="27012410"/>
+            <a:off x="752152" y="26425020"/>
             <a:ext cx="12085669" cy="1200329"/>
           </a:xfrm>
           <a:prstGeom prst="rect">
@@ -4421,8 +4101,8 @@
         </p:nvSpPr>
         <p:spPr>
           <a:xfrm>
-            <a:off x="826916" y="28538960"/>
-            <a:ext cx="12019688" cy="1477328"/>
+            <a:off x="851364" y="27879482"/>
+            <a:ext cx="12019688" cy="3785652"/>
           </a:xfrm>
           <a:prstGeom prst="rect">
             <a:avLst/>
@@ -4435,35 +4115,64 @@
           </a:bodyPr>
           <a:lstStyle/>
           <a:p>
-            <a:pPr marL="457200" indent="-457200" algn="just">
+            <a:pPr marL="514350" indent="-514350" algn="just">
+              <a:buFont typeface="+mj-lt"/>
+              <a:buAutoNum type="arabicPeriod"/>
+            </a:pPr>
+            <a:r>
+              <a:rPr lang="en-US" sz="3000" dirty="0"/>
+              <a:t>Data Mining and Cleaning</a:t>
+            </a:r>
+          </a:p>
+          <a:p>
+            <a:pPr marL="971550" lvl="1" indent="-514350" algn="just">
               <a:buFont typeface="Arial" panose="020B0604020202020204" pitchFamily="34" charset="0"/>
               <a:buChar char="•"/>
             </a:pPr>
             <a:r>
               <a:rPr lang="en-US" sz="3000" dirty="0"/>
-              <a:t>A reactor was constructed from 316 stainless steel tubing and fittings </a:t>
-            </a:r>
-          </a:p>
-          <a:p>
-            <a:pPr marL="457200" indent="-457200" algn="just">
+              <a:t>Importing open source data sets, creating a library of Raman spectra, uniformly formatting data in preparation for analysis</a:t>
+            </a:r>
+          </a:p>
+          <a:p>
+            <a:pPr marL="514350" indent="-514350" algn="just">
+              <a:buFont typeface="+mj-lt"/>
+              <a:buAutoNum type="arabicPeriod"/>
+            </a:pPr>
+            <a:r>
+              <a:rPr lang="en-US" sz="3000" dirty="0"/>
+              <a:t>Data Visualization</a:t>
+            </a:r>
+          </a:p>
+          <a:p>
+            <a:pPr marL="971550" lvl="1" indent="-514350" algn="just">
               <a:buFont typeface="Arial" panose="020B0604020202020204" pitchFamily="34" charset="0"/>
               <a:buChar char="•"/>
             </a:pPr>
             <a:r>
               <a:rPr lang="en-US" sz="3000" dirty="0"/>
-              <a:t>HPLC pumps provide front-end pressure with flow rate 0.1 to 10 mL/min</a:t>
-            </a:r>
-          </a:p>
-          <a:p>
-            <a:pPr marL="457200" indent="-457200" algn="just">
+              <a:t>Outputting plots of peak identification for user validation (if wanted)</a:t>
+            </a:r>
+          </a:p>
+          <a:p>
+            <a:pPr marL="514350" indent="-514350" algn="just">
+              <a:buFont typeface="+mj-lt"/>
+              <a:buAutoNum type="arabicPeriod"/>
+            </a:pPr>
+            <a:r>
+              <a:rPr lang="en-US" sz="3000" dirty="0"/>
+              <a:t>Machine Learning</a:t>
+            </a:r>
+          </a:p>
+          <a:p>
+            <a:pPr marL="971550" lvl="1" indent="-514350" algn="just">
               <a:buFont typeface="Arial" panose="020B0604020202020204" pitchFamily="34" charset="0"/>
               <a:buChar char="•"/>
             </a:pPr>
             <a:r>
               <a:rPr lang="en-US" sz="3000" dirty="0"/>
-              <a:t>Spring-loaded back pressure regulator (BPR) allows for pressure control</a:t>
-            </a:r>
-            <a:endParaRPr lang="en-US" sz="3000" u="sng" dirty="0"/>
+              <a:t>Applying X (software tool(s) name here) to test for peak identification confidence interval</a:t>
+            </a:r>
           </a:p>
         </p:txBody>
       </p:sp>
@@ -4545,7 +4254,7 @@
         <p:spPr>
           <a:xfrm>
             <a:off x="31549289" y="14837571"/>
-            <a:ext cx="11728724" cy="2021066"/>
+            <a:ext cx="11728724" cy="995144"/>
           </a:xfrm>
           <a:prstGeom prst="rect">
             <a:avLst/>
@@ -4564,22 +4273,15 @@
               </a:spcAft>
             </a:pPr>
             <a:r>
-              <a:rPr lang="en-US" sz="2400" u="sng" dirty="0">
+              <a:rPr lang="en-US" altLang="en-US" sz="2400" u="sng" dirty="0">
                 <a:solidFill>
                   <a:srgbClr val="623E92"/>
                 </a:solidFill>
                 <a:latin typeface="Arial Black" panose="020B0A04020102020204" pitchFamily="34" charset="0"/>
+                <a:ea typeface="Arial" charset="0"/>
+                <a:cs typeface="Arial" charset="0"/>
               </a:rPr>
-              <a:t>XRD </a:t>
-            </a:r>
-            <a:r>
-              <a:rPr lang="en-US" sz="2800" u="sng" dirty="0">
-                <a:solidFill>
-                  <a:srgbClr val="623E92"/>
-                </a:solidFill>
-                <a:latin typeface="Arial Black" panose="020B0A04020102020204" pitchFamily="34" charset="0"/>
-              </a:rPr>
-              <a:t>Analysis</a:t>
+              <a:t>Confidence Interval and Machine Learning</a:t>
             </a:r>
             <a:endParaRPr lang="en-US" altLang="en-US" sz="2400" u="sng" dirty="0">
               <a:latin typeface="Arial" charset="0"/>
@@ -4597,42 +4299,8 @@
             </a:pPr>
             <a:r>
               <a:rPr lang="en-US" sz="2800" dirty="0"/>
-              <a:t>Using a </a:t>
-            </a:r>
-            <a:r>
-              <a:rPr lang="en-US" sz="2800" dirty="0" err="1"/>
-              <a:t>Brunker</a:t>
-            </a:r>
-            <a:r>
-              <a:rPr lang="en-US" sz="2800" dirty="0"/>
-              <a:t> D8 Discover with 2D XRD, the sample was analyzed against the Crystallography Open Database ZrO</a:t>
-            </a:r>
-            <a:r>
-              <a:rPr lang="en-US" sz="2800" baseline="-25000" dirty="0"/>
-              <a:t>2</a:t>
-            </a:r>
-            <a:r>
-              <a:rPr lang="en-US" sz="2800" dirty="0"/>
-              <a:t> nanoparticle formation</a:t>
-            </a:r>
-          </a:p>
-          <a:p>
-            <a:pPr marL="588643" indent="-457200" algn="just">
-              <a:spcAft>
-                <a:spcPts val="800"/>
-              </a:spcAft>
-              <a:buFont typeface="Arial" panose="020B0604020202020204" pitchFamily="34" charset="0"/>
-              <a:buChar char="•"/>
-            </a:pPr>
-            <a:r>
-              <a:rPr lang="en-US" sz="2800" dirty="0"/>
-              <a:t>XRD report of synthesized product, green bars show archival data of ZrO</a:t>
-            </a:r>
-            <a:r>
-              <a:rPr lang="en-US" sz="2800" baseline="-25000" dirty="0"/>
-              <a:t>2</a:t>
-            </a:r>
-            <a:endParaRPr lang="en-US" sz="2800" dirty="0"/>
+              <a:t>[text to be filled in at meeting]</a:t>
+            </a:r>
           </a:p>
         </p:txBody>
       </p:sp>
@@ -4650,8 +4318,8 @@
         </p:nvSpPr>
         <p:spPr>
           <a:xfrm>
-            <a:off x="993291" y="8501102"/>
-            <a:ext cx="5197071" cy="584775"/>
+            <a:off x="1041842" y="7659334"/>
+            <a:ext cx="11506287" cy="2677656"/>
           </a:xfrm>
           <a:prstGeom prst="rect">
             <a:avLst/>
@@ -4669,8 +4337,30 @@
               <a:defRPr/>
             </a:pPr>
             <a:r>
-              <a:rPr lang="en-US" sz="3200" dirty="0"/>
-              <a:t>FILL IN</a:t>
+              <a:rPr lang="en-US" sz="2800" dirty="0"/>
+              <a:t>Raman spectra is a way to both identify and quantify components based on vibrational energy different species are known to emit.</a:t>
+            </a:r>
+          </a:p>
+          <a:p>
+            <a:pPr marL="300038" indent="-300038" defTabSz="985803">
+              <a:buFont typeface="Arial" panose="020B0604020202020204" pitchFamily="34" charset="0"/>
+              <a:buChar char="•"/>
+              <a:defRPr/>
+            </a:pPr>
+            <a:r>
+              <a:rPr lang="en-US" sz="2800" dirty="0"/>
+              <a:t>Using data from a custom built supercritical reactor on campus formic acid decomposition.</a:t>
+            </a:r>
+          </a:p>
+          <a:p>
+            <a:pPr marL="300038" indent="-300038" defTabSz="985803">
+              <a:buFont typeface="Arial" panose="020B0604020202020204" pitchFamily="34" charset="0"/>
+              <a:buChar char="•"/>
+              <a:defRPr/>
+            </a:pPr>
+            <a:r>
+              <a:rPr lang="en-US" sz="2800" dirty="0"/>
+              <a:t>Overall decomposition of formic acid constitutes the combination of these two pathways:</a:t>
             </a:r>
           </a:p>
         </p:txBody>
@@ -4871,42 +4561,42 @@
               <a:buNone/>
             </a:pPr>
             <a:r>
+              <a:rPr lang="en-US" sz="5400" dirty="0"/>
+              <a:t>Brandon Kern</a:t>
+            </a:r>
+            <a:r>
+              <a:rPr lang="en-US" sz="5400" baseline="30000" dirty="0"/>
+              <a:t>2</a:t>
+            </a:r>
+            <a:r>
+              <a:rPr lang="en-US" sz="5400" dirty="0"/>
+              <a:t>, Elizabeth</a:t>
+            </a:r>
+            <a:r>
               <a:rPr lang="en-US" sz="4800" dirty="0"/>
-              <a:t>Elizabeth</a:t>
-            </a:r>
-            <a:r>
-              <a:rPr lang="en-US" sz="4723" dirty="0"/>
               <a:t> Rasmussen</a:t>
             </a:r>
             <a:r>
-              <a:rPr lang="en-US" sz="4723" baseline="30000" dirty="0"/>
+              <a:rPr lang="en-US" sz="4800" baseline="30000" dirty="0"/>
               <a:t>1,3</a:t>
             </a:r>
             <a:r>
-              <a:rPr lang="en-US" sz="4723" dirty="0"/>
-              <a:t>, Brandon Kern</a:t>
-            </a:r>
-            <a:r>
-              <a:rPr lang="en-US" sz="4723" baseline="30000" dirty="0"/>
+              <a:rPr lang="en-US" sz="4800" dirty="0"/>
+              <a:t>, Jon Onorato</a:t>
+            </a:r>
+            <a:r>
+              <a:rPr lang="en-US" sz="4800" baseline="30000" dirty="0"/>
+              <a:t>2,3</a:t>
+            </a:r>
+            <a:r>
+              <a:rPr lang="en-US" sz="4800" dirty="0"/>
+              <a:t>, Parker Steichen</a:t>
+            </a:r>
+            <a:r>
+              <a:rPr lang="en-US" sz="4800" baseline="30000" dirty="0"/>
               <a:t>2</a:t>
             </a:r>
-            <a:r>
-              <a:rPr lang="en-US" sz="4723" dirty="0"/>
-              <a:t>, Parker Steichen</a:t>
-            </a:r>
-            <a:r>
-              <a:rPr lang="en-US" sz="4723" baseline="30000" dirty="0"/>
-              <a:t>2</a:t>
-            </a:r>
-            <a:r>
-              <a:rPr lang="en-US" sz="4723" dirty="0"/>
-              <a:t>, Jon Onorato</a:t>
-            </a:r>
-            <a:r>
-              <a:rPr lang="en-US" sz="4723" baseline="30000" dirty="0"/>
-              <a:t>2</a:t>
-            </a:r>
-            <a:endParaRPr lang="en-US" sz="4723" dirty="0"/>
+            <a:endParaRPr lang="en-US" sz="4800" dirty="0"/>
           </a:p>
         </p:txBody>
       </p:sp>
@@ -4926,8 +4616,8 @@
         </p:nvSpPr>
         <p:spPr>
           <a:xfrm>
-            <a:off x="7821175" y="218775"/>
-            <a:ext cx="24524753" cy="3190537"/>
+            <a:off x="8320269" y="500819"/>
+            <a:ext cx="25986676" cy="3190537"/>
           </a:xfrm>
           <a:prstGeom prst="rect">
             <a:avLst/>
@@ -5106,10 +4796,9 @@
               <a:buNone/>
             </a:pPr>
             <a:r>
-              <a:rPr lang="en-US" sz="7666" b="1" dirty="0"/>
-              <a:t>Component Identification in Mixture Raman Spectroscopy for In-Situ Material Decomposition Analysis</a:t>
-            </a:r>
-            <a:endParaRPr lang="en-US" sz="5175" b="1" dirty="0"/>
+              <a:rPr lang="en-US" sz="8000" b="1" dirty="0"/>
+              <a:t>Machine Learning Based Component Identification for In-Situ Raman Spectroscopy Material Decomposition Analysis</a:t>
+            </a:r>
           </a:p>
         </p:txBody>
       </p:sp>
@@ -5378,8 +5067,8 @@
         </p:blipFill>
         <p:spPr>
           <a:xfrm>
-            <a:off x="36070025" y="648851"/>
-            <a:ext cx="6286500" cy="1828800"/>
+            <a:off x="35075635" y="641208"/>
+            <a:ext cx="8087333" cy="2352679"/>
           </a:xfrm>
           <a:prstGeom prst="rect">
             <a:avLst/>
@@ -5414,7 +5103,7 @@
         </p:blipFill>
         <p:spPr>
           <a:xfrm>
-            <a:off x="33976779" y="2777734"/>
+            <a:off x="34306945" y="3257648"/>
             <a:ext cx="8856023" cy="1433433"/>
           </a:xfrm>
           <a:prstGeom prst="rect">
@@ -5450,8 +5139,8 @@
         </p:blipFill>
         <p:spPr>
           <a:xfrm>
-            <a:off x="1937539" y="3114238"/>
-            <a:ext cx="6490363" cy="1786673"/>
+            <a:off x="1340505" y="3144401"/>
+            <a:ext cx="7652514" cy="2106591"/>
           </a:xfrm>
           <a:prstGeom prst="rect">
             <a:avLst/>
@@ -5523,7 +5212,7 @@
         <p:spPr>
           <a:xfrm>
             <a:off x="4444198" y="202920"/>
-            <a:ext cx="2626268" cy="2639994"/>
+            <a:ext cx="2987144" cy="3002756"/>
           </a:xfrm>
           <a:prstGeom prst="rect">
             <a:avLst/>
@@ -5564,7 +5253,231 @@
             </a:pPr>
             <a:r>
               <a:rPr lang="en-US" sz="3200" dirty="0"/>
-              <a:t>FILL IN</a:t>
+              <a:t>FILL IN at meeting</a:t>
+            </a:r>
+          </a:p>
+        </p:txBody>
+      </p:sp>
+      <p:pic>
+        <p:nvPicPr>
+          <p:cNvPr id="3" name="Picture 2">
+            <a:extLst>
+              <a:ext uri="{FF2B5EF4-FFF2-40B4-BE49-F238E27FC236}">
+                <a16:creationId xmlns:a16="http://schemas.microsoft.com/office/drawing/2014/main" id="{DB08023D-51A2-46A4-B94E-3730ED8B8E3A}"/>
+              </a:ext>
+            </a:extLst>
+          </p:cNvPr>
+          <p:cNvPicPr>
+            <a:picLocks noChangeAspect="1"/>
+          </p:cNvPicPr>
+          <p:nvPr/>
+        </p:nvPicPr>
+        <p:blipFill>
+          <a:blip r:embed="rId9"/>
+          <a:stretch>
+            <a:fillRect/>
+          </a:stretch>
+        </p:blipFill>
+        <p:spPr>
+          <a:xfrm>
+            <a:off x="18943833" y="22473169"/>
+            <a:ext cx="5944115" cy="2639797"/>
+          </a:xfrm>
+          <a:prstGeom prst="rect">
+            <a:avLst/>
+          </a:prstGeom>
+        </p:spPr>
+      </p:pic>
+      <p:pic>
+        <p:nvPicPr>
+          <p:cNvPr id="10" name="Picture 9">
+            <a:extLst>
+              <a:ext uri="{FF2B5EF4-FFF2-40B4-BE49-F238E27FC236}">
+                <a16:creationId xmlns:a16="http://schemas.microsoft.com/office/drawing/2014/main" id="{AC2A4068-F258-41D7-AB1F-1A8685DD3415}"/>
+              </a:ext>
+            </a:extLst>
+          </p:cNvPr>
+          <p:cNvPicPr>
+            <a:picLocks noChangeAspect="1"/>
+          </p:cNvPicPr>
+          <p:nvPr/>
+        </p:nvPicPr>
+        <p:blipFill>
+          <a:blip r:embed="rId10"/>
+          <a:stretch>
+            <a:fillRect/>
+          </a:stretch>
+        </p:blipFill>
+        <p:spPr>
+          <a:xfrm>
+            <a:off x="8139081" y="11846494"/>
+            <a:ext cx="4146725" cy="5252490"/>
+          </a:xfrm>
+          <a:prstGeom prst="rect">
+            <a:avLst/>
+          </a:prstGeom>
+        </p:spPr>
+      </p:pic>
+      <p:pic>
+        <p:nvPicPr>
+          <p:cNvPr id="31" name="Picture 30">
+            <a:extLst>
+              <a:ext uri="{FF2B5EF4-FFF2-40B4-BE49-F238E27FC236}">
+                <a16:creationId xmlns:a16="http://schemas.microsoft.com/office/drawing/2014/main" id="{D1ADDF5E-B02A-434E-A824-E0008DAFCFD3}"/>
+              </a:ext>
+            </a:extLst>
+          </p:cNvPr>
+          <p:cNvPicPr>
+            <a:picLocks noChangeAspect="1"/>
+          </p:cNvPicPr>
+          <p:nvPr/>
+        </p:nvPicPr>
+        <p:blipFill>
+          <a:blip r:embed="rId11"/>
+          <a:stretch>
+            <a:fillRect/>
+          </a:stretch>
+        </p:blipFill>
+        <p:spPr>
+          <a:xfrm>
+            <a:off x="1244544" y="11954270"/>
+            <a:ext cx="5884471" cy="5104279"/>
+          </a:xfrm>
+          <a:prstGeom prst="rect">
+            <a:avLst/>
+          </a:prstGeom>
+        </p:spPr>
+      </p:pic>
+      <p:pic>
+        <p:nvPicPr>
+          <p:cNvPr id="45" name="Picture 44" descr="signal processing">
+            <a:extLst>
+              <a:ext uri="{FF2B5EF4-FFF2-40B4-BE49-F238E27FC236}">
+                <a16:creationId xmlns:a16="http://schemas.microsoft.com/office/drawing/2014/main" id="{4417032D-1177-4CBE-ACEA-46C77AC58925}"/>
+              </a:ext>
+            </a:extLst>
+          </p:cNvPr>
+          <p:cNvPicPr/>
+          <p:nvPr/>
+        </p:nvPicPr>
+        <p:blipFill>
+          <a:blip r:embed="rId12" cstate="print">
+            <a:extLst>
+              <a:ext uri="{28A0092B-C50C-407E-A947-70E740481C1C}">
+                <a14:useLocalDpi xmlns:a14="http://schemas.microsoft.com/office/drawing/2010/main" val="0"/>
+              </a:ext>
+            </a:extLst>
+          </a:blip>
+          <a:srcRect/>
+          <a:stretch>
+            <a:fillRect/>
+          </a:stretch>
+        </p:blipFill>
+        <p:spPr bwMode="auto">
+          <a:xfrm>
+            <a:off x="19066902" y="17208806"/>
+            <a:ext cx="5935345" cy="2628900"/>
+          </a:xfrm>
+          <a:prstGeom prst="rect">
+            <a:avLst/>
+          </a:prstGeom>
+          <a:noFill/>
+          <a:ln>
+            <a:noFill/>
+          </a:ln>
+        </p:spPr>
+      </p:pic>
+      <p:pic>
+        <p:nvPicPr>
+          <p:cNvPr id="34" name="Picture 33">
+            <a:extLst>
+              <a:ext uri="{FF2B5EF4-FFF2-40B4-BE49-F238E27FC236}">
+                <a16:creationId xmlns:a16="http://schemas.microsoft.com/office/drawing/2014/main" id="{95C777EB-2573-4BDD-BE1C-AF0B3718B00C}"/>
+              </a:ext>
+            </a:extLst>
+          </p:cNvPr>
+          <p:cNvPicPr>
+            <a:picLocks noChangeAspect="1"/>
+          </p:cNvPicPr>
+          <p:nvPr/>
+        </p:nvPicPr>
+        <p:blipFill rotWithShape="1">
+          <a:blip r:embed="rId13"/>
+          <a:srcRect l="1841" t="1930" r="1470"/>
+          <a:stretch/>
+        </p:blipFill>
+        <p:spPr>
+          <a:xfrm>
+            <a:off x="826916" y="18714218"/>
+            <a:ext cx="11983190" cy="7411324"/>
+          </a:xfrm>
+          <a:prstGeom prst="rect">
+            <a:avLst/>
+          </a:prstGeom>
+        </p:spPr>
+      </p:pic>
+      <p:pic>
+        <p:nvPicPr>
+          <p:cNvPr id="38" name="Picture 37">
+            <a:extLst>
+              <a:ext uri="{FF2B5EF4-FFF2-40B4-BE49-F238E27FC236}">
+                <a16:creationId xmlns:a16="http://schemas.microsoft.com/office/drawing/2014/main" id="{5EFCF98A-06E7-42EB-9D44-5AF3732124FA}"/>
+              </a:ext>
+            </a:extLst>
+          </p:cNvPr>
+          <p:cNvPicPr>
+            <a:picLocks noChangeAspect="1"/>
+          </p:cNvPicPr>
+          <p:nvPr/>
+        </p:nvPicPr>
+        <p:blipFill>
+          <a:blip r:embed="rId14"/>
+          <a:stretch>
+            <a:fillRect/>
+          </a:stretch>
+        </p:blipFill>
+        <p:spPr>
+          <a:xfrm>
+            <a:off x="5525222" y="9912701"/>
+            <a:ext cx="3078190" cy="1282580"/>
+          </a:xfrm>
+          <a:prstGeom prst="rect">
+            <a:avLst/>
+          </a:prstGeom>
+        </p:spPr>
+      </p:pic>
+      <p:sp>
+        <p:nvSpPr>
+          <p:cNvPr id="51" name="TextBox 50">
+            <a:extLst>
+              <a:ext uri="{FF2B5EF4-FFF2-40B4-BE49-F238E27FC236}">
+                <a16:creationId xmlns:a16="http://schemas.microsoft.com/office/drawing/2014/main" id="{041E378F-1E75-4E4C-BA9F-25B220BB9E44}"/>
+              </a:ext>
+            </a:extLst>
+          </p:cNvPr>
+          <p:cNvSpPr txBox="1"/>
+          <p:nvPr/>
+        </p:nvSpPr>
+        <p:spPr>
+          <a:xfrm>
+            <a:off x="576147" y="11210465"/>
+            <a:ext cx="12374512" cy="615553"/>
+          </a:xfrm>
+          <a:prstGeom prst="rect">
+            <a:avLst/>
+          </a:prstGeom>
+          <a:noFill/>
+        </p:spPr>
+        <p:txBody>
+          <a:bodyPr wrap="square" rtlCol="0">
+            <a:spAutoFit/>
+          </a:bodyPr>
+          <a:lstStyle/>
+          <a:p>
+            <a:pPr algn="ctr"/>
+            <a:r>
+              <a:rPr lang="en-US" sz="3400" b="1" u="sng" dirty="0"/>
+              <a:t>Photographs of UW Gasification Reactor with In-Situ Raman Probe</a:t>
             </a:r>
           </a:p>
         </p:txBody>

</xml_diff>